<commit_message>
Brushed up the comver
</commit_message>
<xml_diff>
--- a/zenn-cover.pptx
+++ b/zenn-cover.pptx
@@ -3259,48 +3259,12 @@
           <a:chExt cx="0" cy="0"/>
         </a:xfrm>
       </p:grpSpPr>
-      <p:pic>
-        <p:nvPicPr>
-          <p:cNvPr id="19" name="図 18">
+      <p:sp>
+        <p:nvSpPr>
+          <p:cNvPr id="2" name="正方形/長方形 1">
             <a:extLst>
               <a:ext uri="{FF2B5EF4-FFF2-40B4-BE49-F238E27FC236}">
-                <a16:creationId xmlns:a16="http://schemas.microsoft.com/office/drawing/2014/main" id="{A9B7F4B6-A91B-B70E-924C-2C2B25F1F634}"/>
-              </a:ext>
-            </a:extLst>
-          </p:cNvPr>
-          <p:cNvPicPr>
-            <a:picLocks noChangeAspect="1"/>
-          </p:cNvPicPr>
-          <p:nvPr/>
-        </p:nvPicPr>
-        <p:blipFill>
-          <a:blip r:embed="rId2">
-            <a:extLst>
-              <a:ext uri="{28A0092B-C50C-407E-A947-70E740481C1C}">
-                <a14:useLocalDpi xmlns:a14="http://schemas.microsoft.com/office/drawing/2010/main" val="0"/>
-              </a:ext>
-            </a:extLst>
-          </a:blip>
-          <a:stretch>
-            <a:fillRect/>
-          </a:stretch>
-        </p:blipFill>
-        <p:spPr>
-          <a:xfrm>
-            <a:off x="-2" y="-1"/>
-            <a:ext cx="17945503" cy="17945503"/>
-          </a:xfrm>
-          <a:prstGeom prst="rect">
-            <a:avLst/>
-          </a:prstGeom>
-        </p:spPr>
-      </p:pic>
-      <p:sp>
-        <p:nvSpPr>
-          <p:cNvPr id="15" name="正方形/長方形 14">
-            <a:extLst>
-              <a:ext uri="{FF2B5EF4-FFF2-40B4-BE49-F238E27FC236}">
-                <a16:creationId xmlns:a16="http://schemas.microsoft.com/office/drawing/2014/main" id="{5D2D46B6-3324-3711-5902-E206CC9E1037}"/>
+                <a16:creationId xmlns:a16="http://schemas.microsoft.com/office/drawing/2014/main" id="{CB933471-FBB7-2A19-2640-6175B066A074}"/>
               </a:ext>
             </a:extLst>
           </p:cNvPr>
@@ -3310,7 +3274,7 @@
         <p:spPr>
           <a:xfrm>
             <a:off x="0" y="0"/>
-            <a:ext cx="18000663" cy="25199975"/>
+            <a:ext cx="18000663" cy="7254474"/>
           </a:xfrm>
           <a:prstGeom prst="rect">
             <a:avLst/>
@@ -3339,116 +3303,42 @@
           </a:fontRef>
         </p:style>
         <p:txBody>
-          <a:bodyPr rtlCol="0" anchor="ctr"/>
-          <a:lstStyle/>
-          <a:p>
-            <a:pPr algn="ctr"/>
-            <a:endParaRPr kumimoji="1" lang="ja-JP" altLang="en-US">
-              <a:solidFill>
-                <a:schemeClr val="tx1">
-                  <a:lumMod val="95000"/>
-                  <a:lumOff val="5000"/>
-                </a:schemeClr>
-              </a:solidFill>
-            </a:endParaRPr>
-          </a:p>
-        </p:txBody>
-      </p:sp>
-      <p:sp>
-        <p:nvSpPr>
-          <p:cNvPr id="6" name="正方形/長方形 5">
-            <a:extLst>
-              <a:ext uri="{FF2B5EF4-FFF2-40B4-BE49-F238E27FC236}">
-                <a16:creationId xmlns:a16="http://schemas.microsoft.com/office/drawing/2014/main" id="{5050DF63-C0D0-DED8-7A3D-8CDAFB9151C2}"/>
-              </a:ext>
-            </a:extLst>
-          </p:cNvPr>
-          <p:cNvSpPr/>
-          <p:nvPr/>
-        </p:nvSpPr>
-        <p:spPr>
-          <a:xfrm>
-            <a:off x="0" y="7199975"/>
-            <a:ext cx="18000663" cy="18000000"/>
-          </a:xfrm>
-          <a:prstGeom prst="rect">
-            <a:avLst/>
-          </a:prstGeom>
-          <a:solidFill>
-            <a:srgbClr val="FFB703"/>
-          </a:solidFill>
-          <a:ln>
-            <a:noFill/>
-          </a:ln>
-        </p:spPr>
-        <p:style>
-          <a:lnRef idx="2">
-            <a:schemeClr val="accent6">
-              <a:shade val="15000"/>
-            </a:schemeClr>
-          </a:lnRef>
-          <a:fillRef idx="1">
-            <a:schemeClr val="accent6"/>
-          </a:fillRef>
-          <a:effectRef idx="0">
-            <a:schemeClr val="accent6"/>
-          </a:effectRef>
-          <a:fontRef idx="minor">
-            <a:schemeClr val="lt1"/>
-          </a:fontRef>
-        </p:style>
-        <p:txBody>
-          <a:bodyPr rtlCol="0" anchor="ctr"/>
-          <a:lstStyle/>
-          <a:p>
-            <a:pPr algn="ctr"/>
-            <a:endParaRPr kumimoji="1" lang="ja-JP" altLang="en-US" dirty="0">
-              <a:solidFill>
-                <a:schemeClr val="tx1">
-                  <a:lumMod val="95000"/>
-                  <a:lumOff val="5000"/>
-                </a:schemeClr>
-              </a:solidFill>
-            </a:endParaRPr>
-          </a:p>
-        </p:txBody>
-      </p:sp>
-      <p:sp>
-        <p:nvSpPr>
-          <p:cNvPr id="11" name="テキスト ボックス 10">
-            <a:extLst>
-              <a:ext uri="{FF2B5EF4-FFF2-40B4-BE49-F238E27FC236}">
-                <a16:creationId xmlns:a16="http://schemas.microsoft.com/office/drawing/2014/main" id="{C4DBDD03-D903-1864-DE6C-F7535CAFC61E}"/>
-              </a:ext>
-            </a:extLst>
-          </p:cNvPr>
-          <p:cNvSpPr txBox="1"/>
-          <p:nvPr/>
-        </p:nvSpPr>
-        <p:spPr>
-          <a:xfrm>
-            <a:off x="1371600" y="1302087"/>
-            <a:ext cx="15544800" cy="4524315"/>
-          </a:xfrm>
-          <a:prstGeom prst="rect">
-            <a:avLst/>
-          </a:prstGeom>
-          <a:noFill/>
-        </p:spPr>
-        <p:txBody>
-          <a:bodyPr wrap="square">
-            <a:spAutoFit/>
+          <a:bodyPr wrap="square" lIns="1440000" tIns="1440000" rIns="1440000" bIns="1440000" rtlCol="0" anchor="ctr">
+            <a:normAutofit/>
           </a:bodyPr>
           <a:lstStyle/>
           <a:p>
-            <a:r>
-              <a:rPr lang="en-US" altLang="ja-JP" sz="9600" b="1" dirty="0">
+            <a:pPr marL="0" marR="0" lvl="0" indent="0" defTabSz="457200" rtl="0" eaLnBrk="1" fontAlgn="auto" latinLnBrk="0" hangingPunct="1">
+              <a:lnSpc>
+                <a:spcPct val="100000"/>
+              </a:lnSpc>
+              <a:spcBef>
+                <a:spcPts val="0"/>
+              </a:spcBef>
+              <a:spcAft>
+                <a:spcPts val="0"/>
+              </a:spcAft>
+              <a:buClrTx/>
+              <a:buSzTx/>
+              <a:buFontTx/>
+              <a:buNone/>
+              <a:tabLst/>
+              <a:defRPr/>
+            </a:pPr>
+            <a:r>
+              <a:rPr kumimoji="0" lang="en-US" altLang="ja-JP" sz="8800" b="1" i="0" u="none" strike="noStrike" kern="1200" cap="none" spc="0" normalizeH="0" baseline="0" noProof="0" dirty="0">
+                <a:ln>
+                  <a:noFill/>
+                </a:ln>
                 <a:solidFill>
-                  <a:schemeClr val="tx1">
+                  <a:prstClr val="black">
                     <a:lumMod val="95000"/>
                     <a:lumOff val="5000"/>
-                  </a:schemeClr>
+                  </a:prstClr>
                 </a:solidFill>
+                <a:effectLst/>
+                <a:uLnTx/>
+                <a:uFillTx/>
                 <a:latin typeface="Noto Sans JP SemiBold" panose="020B0200000000000000" pitchFamily="50" charset="-128"/>
                 <a:ea typeface="Noto Sans JP SemiBold" panose="020B0200000000000000" pitchFamily="50" charset="-128"/>
                 <a:cs typeface="HackGen" panose="020B0509020203020207" pitchFamily="49" charset="-128"/>
@@ -3456,13 +3346,19 @@
               <a:t>Windows GUI</a:t>
             </a:r>
             <a:r>
-              <a:rPr lang="ja-JP" altLang="en-US" sz="9600" b="1" dirty="0">
+              <a:rPr kumimoji="0" lang="ja-JP" altLang="en-US" sz="8800" b="1" i="0" u="none" strike="noStrike" kern="1200" cap="none" spc="0" normalizeH="0" baseline="0" noProof="0" dirty="0">
+                <a:ln>
+                  <a:noFill/>
+                </a:ln>
                 <a:solidFill>
-                  <a:schemeClr val="tx1">
+                  <a:prstClr val="black">
                     <a:lumMod val="95000"/>
                     <a:lumOff val="5000"/>
-                  </a:schemeClr>
+                  </a:prstClr>
                 </a:solidFill>
+                <a:effectLst/>
+                <a:uLnTx/>
+                <a:uFillTx/>
                 <a:latin typeface="Noto Sans JP SemiBold" panose="020B0200000000000000" pitchFamily="50" charset="-128"/>
                 <a:ea typeface="Noto Sans JP SemiBold" panose="020B0200000000000000" pitchFamily="50" charset="-128"/>
                 <a:cs typeface="HackGen" panose="020B0509020203020207" pitchFamily="49" charset="-128"/>
@@ -3470,13 +3366,19 @@
               <a:t>環境と</a:t>
             </a:r>
             <a:r>
-              <a:rPr lang="en-US" altLang="ja-JP" sz="9600" b="1" dirty="0">
+              <a:rPr kumimoji="0" lang="en-US" altLang="ja-JP" sz="8800" b="1" i="0" u="none" strike="noStrike" kern="1200" cap="none" spc="0" normalizeH="0" baseline="0" noProof="0" dirty="0">
+                <a:ln>
+                  <a:noFill/>
+                </a:ln>
                 <a:solidFill>
-                  <a:schemeClr val="tx1">
+                  <a:prstClr val="black">
                     <a:lumMod val="95000"/>
                     <a:lumOff val="5000"/>
-                  </a:schemeClr>
+                  </a:prstClr>
                 </a:solidFill>
+                <a:effectLst/>
+                <a:uLnTx/>
+                <a:uFillTx/>
                 <a:latin typeface="Noto Sans JP SemiBold" panose="020B0200000000000000" pitchFamily="50" charset="-128"/>
                 <a:ea typeface="Noto Sans JP SemiBold" panose="020B0200000000000000" pitchFamily="50" charset="-128"/>
                 <a:cs typeface="HackGen" panose="020B0509020203020207" pitchFamily="49" charset="-128"/>
@@ -3484,13 +3386,19 @@
               <a:t>p5.js</a:t>
             </a:r>
             <a:r>
-              <a:rPr lang="ja-JP" altLang="en-US" sz="9600" b="1" dirty="0">
+              <a:rPr kumimoji="0" lang="ja-JP" altLang="en-US" sz="8800" b="1" i="0" u="none" strike="noStrike" kern="1200" cap="none" spc="0" normalizeH="0" baseline="0" noProof="0" dirty="0">
+                <a:ln>
+                  <a:noFill/>
+                </a:ln>
                 <a:solidFill>
-                  <a:schemeClr val="tx1">
+                  <a:prstClr val="black">
                     <a:lumMod val="95000"/>
                     <a:lumOff val="5000"/>
-                  </a:schemeClr>
+                  </a:prstClr>
                 </a:solidFill>
+                <a:effectLst/>
+                <a:uLnTx/>
+                <a:uFillTx/>
                 <a:latin typeface="Noto Sans JP SemiBold" panose="020B0200000000000000" pitchFamily="50" charset="-128"/>
                 <a:ea typeface="Noto Sans JP SemiBold" panose="020B0200000000000000" pitchFamily="50" charset="-128"/>
                 <a:cs typeface="HackGen" panose="020B0509020203020207" pitchFamily="49" charset="-128"/>
@@ -3498,13 +3406,19 @@
               <a:t>で独自フォントの</a:t>
             </a:r>
             <a:r>
-              <a:rPr lang="en-US" altLang="ja-JP" sz="9600" b="1" dirty="0">
+              <a:rPr kumimoji="0" lang="en-US" altLang="ja-JP" sz="8800" b="1" i="0" u="none" strike="noStrike" kern="1200" cap="none" spc="0" normalizeH="0" baseline="0" noProof="0" dirty="0">
+                <a:ln>
+                  <a:noFill/>
+                </a:ln>
                 <a:solidFill>
-                  <a:schemeClr val="tx1">
+                  <a:prstClr val="black">
                     <a:lumMod val="95000"/>
                     <a:lumOff val="5000"/>
-                  </a:schemeClr>
+                  </a:prstClr>
                 </a:solidFill>
+                <a:effectLst/>
+                <a:uLnTx/>
+                <a:uFillTx/>
                 <a:latin typeface="Noto Sans JP SemiBold" panose="020B0200000000000000" pitchFamily="50" charset="-128"/>
                 <a:ea typeface="Noto Sans JP SemiBold" panose="020B0200000000000000" pitchFamily="50" charset="-128"/>
                 <a:cs typeface="HackGen" panose="020B0509020203020207" pitchFamily="49" charset="-128"/>
@@ -3512,13 +3426,19 @@
               <a:t>OCR</a:t>
             </a:r>
             <a:r>
-              <a:rPr lang="ja-JP" altLang="en-US" sz="9600" b="1" dirty="0">
+              <a:rPr kumimoji="0" lang="ja-JP" altLang="en-US" sz="8800" b="1" i="0" u="none" strike="noStrike" kern="1200" cap="none" spc="0" normalizeH="0" baseline="0" noProof="0" dirty="0">
+                <a:ln>
+                  <a:noFill/>
+                </a:ln>
                 <a:solidFill>
-                  <a:schemeClr val="tx1">
+                  <a:prstClr val="black">
                     <a:lumMod val="95000"/>
                     <a:lumOff val="5000"/>
-                  </a:schemeClr>
+                  </a:prstClr>
                 </a:solidFill>
+                <a:effectLst/>
+                <a:uLnTx/>
+                <a:uFillTx/>
                 <a:latin typeface="Noto Sans JP SemiBold" panose="020B0200000000000000" pitchFamily="50" charset="-128"/>
                 <a:ea typeface="Noto Sans JP SemiBold" panose="020B0200000000000000" pitchFamily="50" charset="-128"/>
                 <a:cs typeface="HackGen" panose="020B0509020203020207" pitchFamily="49" charset="-128"/>
@@ -3543,15 +3463,15 @@
           <p:nvPr/>
         </p:nvPicPr>
         <p:blipFill>
-          <a:blip r:embed="rId3"/>
+          <a:blip r:embed="rId2"/>
           <a:stretch>
             <a:fillRect/>
           </a:stretch>
         </p:blipFill>
         <p:spPr>
           <a:xfrm>
-            <a:off x="0" y="7199974"/>
-            <a:ext cx="18000663" cy="17945503"/>
+            <a:off x="0" y="7254474"/>
+            <a:ext cx="18000662" cy="17945501"/>
           </a:xfrm>
           <a:prstGeom prst="rect">
             <a:avLst/>
@@ -3572,7 +3492,7 @@
         </p:nvSpPr>
         <p:spPr>
           <a:xfrm>
-            <a:off x="579121" y="22362400"/>
+            <a:off x="579122" y="22416902"/>
             <a:ext cx="5309444" cy="1330044"/>
           </a:xfrm>
           <a:prstGeom prst="rect">
@@ -3631,7 +3551,7 @@
           <p:nvPr/>
         </p:nvPicPr>
         <p:blipFill>
-          <a:blip r:embed="rId4">
+          <a:blip r:embed="rId3">
             <a:extLst>
               <a:ext uri="{28A0092B-C50C-407E-A947-70E740481C1C}">
                 <a14:useLocalDpi xmlns:a14="http://schemas.microsoft.com/office/drawing/2010/main" val="0"/>
@@ -3645,14 +3565,14 @@
         </p:blipFill>
         <p:spPr bwMode="auto">
           <a:xfrm>
-            <a:off x="2086184" y="20160455"/>
+            <a:off x="2086185" y="20214957"/>
             <a:ext cx="2239169" cy="2239169"/>
           </a:xfrm>
           <a:prstGeom prst="ellipse">
             <a:avLst/>
           </a:prstGeom>
           <a:noFill/>
-          <a:ln w="50800">
+          <a:ln w="76200">
             <a:solidFill>
               <a:schemeClr val="bg1"/>
             </a:solidFill>
@@ -3668,6 +3588,68 @@
           </a:extLst>
         </p:spPr>
       </p:pic>
+      <p:sp>
+        <p:nvSpPr>
+          <p:cNvPr id="3" name="正方形/長方形 2">
+            <a:extLst>
+              <a:ext uri="{FF2B5EF4-FFF2-40B4-BE49-F238E27FC236}">
+                <a16:creationId xmlns:a16="http://schemas.microsoft.com/office/drawing/2014/main" id="{8B716322-7719-F1B3-D8F6-D380AB6A16A7}"/>
+              </a:ext>
+            </a:extLst>
+          </p:cNvPr>
+          <p:cNvSpPr/>
+          <p:nvPr/>
+        </p:nvSpPr>
+        <p:spPr>
+          <a:xfrm>
+            <a:off x="20878798" y="5257800"/>
+            <a:ext cx="12306301" cy="3200400"/>
+          </a:xfrm>
+          <a:prstGeom prst="rect">
+            <a:avLst/>
+          </a:prstGeom>
+        </p:spPr>
+        <p:style>
+          <a:lnRef idx="2">
+            <a:schemeClr val="accent1">
+              <a:shade val="15000"/>
+            </a:schemeClr>
+          </a:lnRef>
+          <a:fillRef idx="1">
+            <a:schemeClr val="accent1"/>
+          </a:fillRef>
+          <a:effectRef idx="0">
+            <a:schemeClr val="accent1"/>
+          </a:effectRef>
+          <a:fontRef idx="minor">
+            <a:schemeClr val="lt1"/>
+          </a:fontRef>
+        </p:style>
+        <p:txBody>
+          <a:bodyPr rtlCol="0" anchor="ctr"/>
+          <a:lstStyle/>
+          <a:p>
+            <a:pPr algn="ctr"/>
+            <a:r>
+              <a:rPr kumimoji="1" lang="en-US" altLang="ja-JP" sz="9600" dirty="0" err="1"/>
+              <a:t>IrfanView</a:t>
+            </a:r>
+            <a:r>
+              <a:rPr kumimoji="1" lang="ja-JP" altLang="en-US" sz="9600" dirty="0"/>
+              <a:t>で</a:t>
+            </a:r>
+            <a:endParaRPr kumimoji="1" lang="en-US" altLang="ja-JP" sz="9600" dirty="0"/>
+          </a:p>
+          <a:p>
+            <a:pPr algn="ctr"/>
+            <a:r>
+              <a:rPr kumimoji="1" lang="en-US" altLang="ja-JP" sz="9600" dirty="0"/>
+              <a:t>Resize/resample 30%</a:t>
+            </a:r>
+            <a:endParaRPr kumimoji="1" lang="ja-JP" altLang="en-US" sz="9600" dirty="0"/>
+          </a:p>
+        </p:txBody>
+      </p:sp>
     </p:spTree>
     <p:extLst>
       <p:ext uri="{BB962C8B-B14F-4D97-AF65-F5344CB8AC3E}">

</xml_diff>